<commit_message>
Updated developer guide for AddTaskCommand and FindModuleCommand
</commit_message>
<xml_diff>
--- a/docs/diagrams/AddTaskSequenceDiagram.pptx
+++ b/docs/diagrams/AddTaskSequenceDiagram.pptx
@@ -3450,8 +3450,8 @@
         </p:nvSpPr>
         <p:spPr>
           <a:xfrm>
-            <a:off x="1828800" y="1257300"/>
-            <a:ext cx="5829300" cy="4343400"/>
+            <a:off x="996043" y="926286"/>
+            <a:ext cx="8847118" cy="4343400"/>
           </a:xfrm>
           <a:prstGeom prst="roundRect">
             <a:avLst>
@@ -3511,7 +3511,7 @@
         </p:nvSpPr>
         <p:spPr>
           <a:xfrm>
-            <a:off x="1988045" y="1572646"/>
+            <a:off x="1155288" y="1241632"/>
             <a:ext cx="1455629" cy="346760"/>
           </a:xfrm>
           <a:prstGeom prst="rect">
@@ -3580,7 +3580,7 @@
         </p:nvCxnSpPr>
         <p:spPr>
           <a:xfrm>
-            <a:off x="2715859" y="1936317"/>
+            <a:off x="1883102" y="1605303"/>
             <a:ext cx="0" cy="3481399"/>
           </a:xfrm>
           <a:prstGeom prst="line">
@@ -3617,7 +3617,7 @@
         </p:nvSpPr>
         <p:spPr>
           <a:xfrm>
-            <a:off x="2643851" y="2287011"/>
+            <a:off x="1811094" y="1955997"/>
             <a:ext cx="152400" cy="2932689"/>
           </a:xfrm>
           <a:prstGeom prst="rect">
@@ -3664,7 +3664,7 @@
         </p:nvSpPr>
         <p:spPr>
           <a:xfrm>
-            <a:off x="4542088" y="1451722"/>
+            <a:off x="3709331" y="1120708"/>
             <a:ext cx="1219200" cy="467684"/>
           </a:xfrm>
           <a:prstGeom prst="rect">
@@ -3736,7 +3736,7 @@
         </p:nvCxnSpPr>
         <p:spPr>
           <a:xfrm>
-            <a:off x="5155487" y="1936317"/>
+            <a:off x="4322730" y="1605303"/>
             <a:ext cx="0" cy="1482984"/>
           </a:xfrm>
           <a:prstGeom prst="line">
@@ -3773,7 +3773,7 @@
         </p:nvSpPr>
         <p:spPr>
           <a:xfrm>
-            <a:off x="5083480" y="2394510"/>
+            <a:off x="4250723" y="2063496"/>
             <a:ext cx="154408" cy="767790"/>
           </a:xfrm>
           <a:prstGeom prst="rect">
@@ -3821,15 +3821,14 @@
           <p:cNvPr id="20" name="Straight Connector 19"/>
           <p:cNvCxnSpPr>
             <a:cxnSpLocks/>
-            <a:stCxn id="21" idx="0"/>
             <a:endCxn id="4" idx="0"/>
           </p:cNvCxnSpPr>
           <p:nvPr/>
         </p:nvCxnSpPr>
         <p:spPr>
           <a:xfrm>
-            <a:off x="6706982" y="2642333"/>
-            <a:ext cx="0" cy="2644578"/>
+            <a:off x="5874225" y="1796008"/>
+            <a:ext cx="16692" cy="3205785"/>
           </a:xfrm>
           <a:prstGeom prst="line">
             <a:avLst/>
@@ -3865,8 +3864,8 @@
         </p:nvSpPr>
         <p:spPr>
           <a:xfrm>
-            <a:off x="6630782" y="2642333"/>
-            <a:ext cx="152400" cy="276003"/>
+            <a:off x="5795658" y="2092445"/>
+            <a:ext cx="154767" cy="494878"/>
           </a:xfrm>
           <a:prstGeom prst="rect">
             <a:avLst/>
@@ -3907,12 +3906,14 @@
       <p:cxnSp>
         <p:nvCxnSpPr>
           <p:cNvPr id="23" name="Straight Arrow Connector 22"/>
-          <p:cNvCxnSpPr/>
+          <p:cNvCxnSpPr>
+            <a:cxnSpLocks/>
+          </p:cNvCxnSpPr>
           <p:nvPr/>
         </p:nvCxnSpPr>
         <p:spPr>
           <a:xfrm>
-            <a:off x="1524000" y="2290699"/>
+            <a:off x="691243" y="1959685"/>
             <a:ext cx="1119851" cy="0"/>
           </a:xfrm>
           <a:prstGeom prst="straightConnector1">
@@ -3948,8 +3949,8 @@
         </p:nvSpPr>
         <p:spPr>
           <a:xfrm>
-            <a:off x="1143000" y="2019300"/>
-            <a:ext cx="1424846" cy="215444"/>
+            <a:off x="-32657" y="1688286"/>
+            <a:ext cx="1767746" cy="215444"/>
           </a:xfrm>
           <a:prstGeom prst="rect">
             <a:avLst/>
@@ -3993,13 +3994,15 @@
       <p:cxnSp>
         <p:nvCxnSpPr>
           <p:cNvPr id="28" name="Straight Arrow Connector 27"/>
-          <p:cNvCxnSpPr/>
+          <p:cNvCxnSpPr>
+            <a:cxnSpLocks/>
+          </p:cNvCxnSpPr>
           <p:nvPr/>
         </p:nvCxnSpPr>
         <p:spPr>
-          <a:xfrm flipV="1">
-            <a:off x="5240872" y="2541040"/>
-            <a:ext cx="922392" cy="1"/>
+          <a:xfrm>
+            <a:off x="4424388" y="2137253"/>
+            <a:ext cx="1364110" cy="0"/>
           </a:xfrm>
           <a:prstGeom prst="straightConnector1">
             <a:avLst/>
@@ -4034,7 +4037,7 @@
         </p:nvSpPr>
         <p:spPr>
           <a:xfrm>
-            <a:off x="4348321" y="3512771"/>
+            <a:off x="3515564" y="3181757"/>
             <a:ext cx="855809" cy="215444"/>
           </a:xfrm>
           <a:prstGeom prst="rect">
@@ -4069,12 +4072,14 @@
       <p:cxnSp>
         <p:nvCxnSpPr>
           <p:cNvPr id="34" name="Straight Arrow Connector 33"/>
-          <p:cNvCxnSpPr/>
+          <p:cNvCxnSpPr>
+            <a:cxnSpLocks/>
+          </p:cNvCxnSpPr>
           <p:nvPr/>
         </p:nvCxnSpPr>
         <p:spPr>
           <a:xfrm>
-            <a:off x="5214008" y="2906932"/>
+            <a:off x="4381251" y="2575918"/>
             <a:ext cx="1492974" cy="0"/>
           </a:xfrm>
           <a:prstGeom prst="straightConnector1">
@@ -4114,7 +4119,7 @@
         </p:nvCxnSpPr>
         <p:spPr>
           <a:xfrm>
-            <a:off x="2796251" y="3162300"/>
+            <a:off x="1963494" y="2831286"/>
             <a:ext cx="2348067" cy="0"/>
           </a:xfrm>
           <a:prstGeom prst="straightConnector1">
@@ -4147,12 +4152,14 @@
       <p:cxnSp>
         <p:nvCxnSpPr>
           <p:cNvPr id="37" name="Straight Arrow Connector 36"/>
-          <p:cNvCxnSpPr/>
+          <p:cNvCxnSpPr>
+            <a:cxnSpLocks/>
+          </p:cNvCxnSpPr>
           <p:nvPr/>
         </p:nvCxnSpPr>
         <p:spPr>
           <a:xfrm>
-            <a:off x="1485899" y="5219700"/>
+            <a:off x="653142" y="4888686"/>
             <a:ext cx="1196051" cy="0"/>
           </a:xfrm>
           <a:prstGeom prst="straightConnector1">
@@ -4190,7 +4197,7 @@
         </p:nvSpPr>
         <p:spPr>
           <a:xfrm>
-            <a:off x="6631388" y="3760013"/>
+            <a:off x="8003056" y="3429000"/>
             <a:ext cx="161322" cy="1307285"/>
           </a:xfrm>
           <a:prstGeom prst="rect">
@@ -4237,8 +4244,8 @@
         </p:nvSpPr>
         <p:spPr>
           <a:xfrm>
-            <a:off x="2990089" y="2134850"/>
-            <a:ext cx="2034871" cy="215444"/>
+            <a:off x="1994017" y="1799727"/>
+            <a:ext cx="2256704" cy="215444"/>
           </a:xfrm>
           <a:prstGeom prst="rect">
             <a:avLst/>
@@ -4289,7 +4296,7 @@
         </p:nvSpPr>
         <p:spPr>
           <a:xfrm>
-            <a:off x="4377655" y="4819776"/>
+            <a:off x="3544898" y="4488762"/>
             <a:ext cx="621216" cy="215444"/>
           </a:xfrm>
           <a:prstGeom prst="rect">
@@ -4329,7 +4336,7 @@
         </p:nvSpPr>
         <p:spPr>
           <a:xfrm>
-            <a:off x="1750170" y="4974601"/>
+            <a:off x="917413" y="4643587"/>
             <a:ext cx="762000" cy="215444"/>
           </a:xfrm>
           <a:prstGeom prst="rect">
@@ -4369,7 +4376,7 @@
         </p:nvSpPr>
         <p:spPr>
           <a:xfrm>
-            <a:off x="3829692" y="2934493"/>
+            <a:off x="2996935" y="2603479"/>
             <a:ext cx="220343" cy="215444"/>
           </a:xfrm>
           <a:prstGeom prst="rect">
@@ -4403,47 +4410,14 @@
       </p:sp>
       <p:sp>
         <p:nvSpPr>
-          <p:cNvPr id="4" name="TextBox 3"/>
-          <p:cNvSpPr txBox="1"/>
-          <p:nvPr/>
-        </p:nvSpPr>
-        <p:spPr>
-          <a:xfrm>
-            <a:off x="6577780" y="5286911"/>
-            <a:ext cx="258404" cy="261610"/>
-          </a:xfrm>
-          <a:prstGeom prst="rect">
-            <a:avLst/>
-          </a:prstGeom>
-          <a:noFill/>
-        </p:spPr>
-        <p:txBody>
-          <a:bodyPr wrap="none" rtlCol="0">
-            <a:spAutoFit/>
-          </a:bodyPr>
-          <a:lstStyle/>
-          <a:p>
-            <a:r>
-              <a:rPr lang="en-SG" sz="1100" dirty="0">
-                <a:solidFill>
-                  <a:srgbClr val="002060"/>
-                </a:solidFill>
-              </a:rPr>
-              <a:t>X</a:t>
-            </a:r>
-          </a:p>
-        </p:txBody>
-      </p:sp>
-      <p:sp>
-        <p:nvSpPr>
-          <p:cNvPr id="19" name="Rectangle 62"/>
+          <p:cNvPr id="40" name="Rectangle 62"/>
           <p:cNvSpPr/>
           <p:nvPr/>
         </p:nvSpPr>
         <p:spPr>
           <a:xfrm>
-            <a:off x="6140876" y="2288968"/>
-            <a:ext cx="1093635" cy="461538"/>
+            <a:off x="7192604" y="1500320"/>
+            <a:ext cx="1901758" cy="432035"/>
           </a:xfrm>
           <a:prstGeom prst="rect">
             <a:avLst/>
@@ -4510,6 +4484,245 @@
       </p:sp>
       <p:cxnSp>
         <p:nvCxnSpPr>
+          <p:cNvPr id="46" name="Straight Connector 45"/>
+          <p:cNvCxnSpPr>
+            <a:cxnSpLocks/>
+          </p:cNvCxnSpPr>
+          <p:nvPr/>
+        </p:nvCxnSpPr>
+        <p:spPr>
+          <a:xfrm>
+            <a:off x="8050424" y="1920783"/>
+            <a:ext cx="33293" cy="3296724"/>
+          </a:xfrm>
+          <a:prstGeom prst="line">
+            <a:avLst/>
+          </a:prstGeom>
+          <a:ln w="19050">
+            <a:solidFill>
+              <a:srgbClr val="0070C0"/>
+            </a:solidFill>
+            <a:prstDash val="sysDash"/>
+          </a:ln>
+          <a:effectLst/>
+        </p:spPr>
+        <p:style>
+          <a:lnRef idx="1">
+            <a:schemeClr val="accent1"/>
+          </a:lnRef>
+          <a:fillRef idx="2">
+            <a:schemeClr val="accent1"/>
+          </a:fillRef>
+          <a:effectRef idx="1">
+            <a:schemeClr val="accent1"/>
+          </a:effectRef>
+          <a:fontRef idx="minor">
+            <a:schemeClr val="dk1"/>
+          </a:fontRef>
+        </p:style>
+      </p:cxnSp>
+      <p:sp>
+        <p:nvSpPr>
+          <p:cNvPr id="49" name="Rectangle 48"/>
+          <p:cNvSpPr/>
+          <p:nvPr/>
+        </p:nvSpPr>
+        <p:spPr>
+          <a:xfrm>
+            <a:off x="7990427" y="2224444"/>
+            <a:ext cx="139932" cy="266380"/>
+          </a:xfrm>
+          <a:prstGeom prst="rect">
+            <a:avLst/>
+          </a:prstGeom>
+          <a:solidFill>
+            <a:srgbClr val="0070C0"/>
+          </a:solidFill>
+          <a:ln>
+            <a:solidFill>
+              <a:srgbClr val="0070C0"/>
+            </a:solidFill>
+          </a:ln>
+          <a:effectLst/>
+        </p:spPr>
+        <p:style>
+          <a:lnRef idx="1">
+            <a:schemeClr val="accent3"/>
+          </a:lnRef>
+          <a:fillRef idx="2">
+            <a:schemeClr val="accent3"/>
+          </a:fillRef>
+          <a:effectRef idx="1">
+            <a:schemeClr val="accent3"/>
+          </a:effectRef>
+          <a:fontRef idx="minor">
+            <a:schemeClr val="dk1"/>
+          </a:fontRef>
+        </p:style>
+        <p:txBody>
+          <a:bodyPr rtlCol="0" anchor="ctr"/>
+          <a:lstStyle/>
+          <a:p>
+            <a:pPr algn="ctr"/>
+            <a:endParaRPr lang="en-SG" sz="1400"/>
+          </a:p>
+        </p:txBody>
+      </p:sp>
+      <p:cxnSp>
+        <p:nvCxnSpPr>
+          <p:cNvPr id="50" name="Straight Arrow Connector 49"/>
+          <p:cNvCxnSpPr>
+            <a:cxnSpLocks/>
+          </p:cNvCxnSpPr>
+          <p:nvPr/>
+        </p:nvCxnSpPr>
+        <p:spPr>
+          <a:xfrm flipV="1">
+            <a:off x="5950425" y="2217737"/>
+            <a:ext cx="2065628" cy="15567"/>
+          </a:xfrm>
+          <a:prstGeom prst="straightConnector1">
+            <a:avLst/>
+          </a:prstGeom>
+          <a:ln w="19050">
+            <a:solidFill>
+              <a:srgbClr val="0070C0"/>
+            </a:solidFill>
+            <a:tailEnd type="arrow"/>
+          </a:ln>
+        </p:spPr>
+        <p:style>
+          <a:lnRef idx="1">
+            <a:schemeClr val="accent1"/>
+          </a:lnRef>
+          <a:fillRef idx="0">
+            <a:schemeClr val="accent1"/>
+          </a:fillRef>
+          <a:effectRef idx="0">
+            <a:schemeClr val="accent1"/>
+          </a:effectRef>
+          <a:fontRef idx="minor">
+            <a:schemeClr val="tx1"/>
+          </a:fontRef>
+        </p:style>
+      </p:cxnSp>
+      <p:sp>
+        <p:nvSpPr>
+          <p:cNvPr id="4" name="TextBox 3"/>
+          <p:cNvSpPr txBox="1"/>
+          <p:nvPr/>
+        </p:nvSpPr>
+        <p:spPr>
+          <a:xfrm>
+            <a:off x="5745023" y="4955897"/>
+            <a:ext cx="258404" cy="261610"/>
+          </a:xfrm>
+          <a:prstGeom prst="rect">
+            <a:avLst/>
+          </a:prstGeom>
+          <a:noFill/>
+        </p:spPr>
+        <p:txBody>
+          <a:bodyPr wrap="square" rtlCol="0">
+            <a:spAutoFit/>
+          </a:bodyPr>
+          <a:lstStyle/>
+          <a:p>
+            <a:r>
+              <a:rPr lang="en-SG" sz="1100" dirty="0">
+                <a:solidFill>
+                  <a:srgbClr val="002060"/>
+                </a:solidFill>
+              </a:rPr>
+              <a:t>X</a:t>
+            </a:r>
+          </a:p>
+        </p:txBody>
+      </p:sp>
+      <p:sp>
+        <p:nvSpPr>
+          <p:cNvPr id="19" name="Rectangle 62"/>
+          <p:cNvSpPr/>
+          <p:nvPr/>
+        </p:nvSpPr>
+        <p:spPr>
+          <a:xfrm>
+            <a:off x="5264863" y="1354386"/>
+            <a:ext cx="1699146" cy="461538"/>
+          </a:xfrm>
+          <a:prstGeom prst="rect">
+            <a:avLst/>
+          </a:prstGeom>
+          <a:solidFill>
+            <a:srgbClr val="0070C0"/>
+          </a:solidFill>
+          <a:ln w="19050">
+            <a:solidFill>
+              <a:srgbClr val="0070C0"/>
+            </a:solidFill>
+          </a:ln>
+          <a:effectLst/>
+        </p:spPr>
+        <p:style>
+          <a:lnRef idx="1">
+            <a:schemeClr val="accent2"/>
+          </a:lnRef>
+          <a:fillRef idx="2">
+            <a:schemeClr val="accent2"/>
+          </a:fillRef>
+          <a:effectRef idx="1">
+            <a:schemeClr val="accent2"/>
+          </a:effectRef>
+          <a:fontRef idx="minor">
+            <a:schemeClr val="dk1"/>
+          </a:fontRef>
+        </p:style>
+        <p:txBody>
+          <a:bodyPr rtlCol="0" anchor="ctr"/>
+          <a:lstStyle/>
+          <a:p>
+            <a:pPr algn="ctr"/>
+            <a:r>
+              <a:rPr lang="en-US" sz="1600" dirty="0">
+                <a:solidFill>
+                  <a:schemeClr val="bg1"/>
+                </a:solidFill>
+              </a:rPr>
+              <a:t>:</a:t>
+            </a:r>
+            <a:r>
+              <a:rPr lang="en-US" sz="1600" dirty="0" err="1">
+                <a:solidFill>
+                  <a:schemeClr val="bg1"/>
+                </a:solidFill>
+              </a:rPr>
+              <a:t>AddTask</a:t>
+            </a:r>
+            <a:br>
+              <a:rPr lang="en-US" sz="1600" dirty="0">
+                <a:solidFill>
+                  <a:schemeClr val="bg1"/>
+                </a:solidFill>
+              </a:rPr>
+            </a:br>
+            <a:r>
+              <a:rPr lang="en-US" sz="1600" dirty="0" err="1">
+                <a:solidFill>
+                  <a:schemeClr val="bg1"/>
+                </a:solidFill>
+              </a:rPr>
+              <a:t>CommandParser</a:t>
+            </a:r>
+            <a:endParaRPr lang="en-SG" sz="1600" dirty="0">
+              <a:solidFill>
+                <a:schemeClr val="bg1"/>
+              </a:solidFill>
+            </a:endParaRPr>
+          </a:p>
+        </p:txBody>
+      </p:sp>
+      <p:cxnSp>
+        <p:nvCxnSpPr>
           <p:cNvPr id="66" name="Straight Arrow Connector 65">
             <a:extLst>
               <a:ext uri="{FF2B5EF4-FFF2-40B4-BE49-F238E27FC236}">
@@ -4524,8 +4737,8 @@
         </p:nvCxnSpPr>
         <p:spPr>
           <a:xfrm>
-            <a:off x="2796251" y="3760014"/>
-            <a:ext cx="3832164" cy="1"/>
+            <a:off x="1963494" y="3429000"/>
+            <a:ext cx="6005839" cy="0"/>
           </a:xfrm>
           <a:prstGeom prst="straightConnector1">
             <a:avLst/>
@@ -4568,7 +4781,7 @@
         </p:nvCxnSpPr>
         <p:spPr>
           <a:xfrm>
-            <a:off x="2813145" y="2392618"/>
+            <a:off x="1980388" y="2061604"/>
             <a:ext cx="2256705" cy="1"/>
           </a:xfrm>
           <a:prstGeom prst="straightConnector1">
@@ -4612,8 +4825,8 @@
         </p:nvCxnSpPr>
         <p:spPr>
           <a:xfrm>
-            <a:off x="2796898" y="5065162"/>
-            <a:ext cx="3831517" cy="0"/>
+            <a:off x="1963494" y="4703864"/>
+            <a:ext cx="6035665" cy="0"/>
           </a:xfrm>
           <a:prstGeom prst="straightConnector1">
             <a:avLst/>
@@ -4642,6 +4855,98 @@
           </a:fontRef>
         </p:style>
       </p:cxnSp>
+      <p:cxnSp>
+        <p:nvCxnSpPr>
+          <p:cNvPr id="74" name="Straight Arrow Connector 73">
+            <a:extLst>
+              <a:ext uri="{FF2B5EF4-FFF2-40B4-BE49-F238E27FC236}">
+                <a16:creationId xmlns:a16="http://schemas.microsoft.com/office/drawing/2014/main" id="{854D9FBB-2B36-4DC9-8B58-F7F177A8E586}"/>
+              </a:ext>
+            </a:extLst>
+          </p:cNvPr>
+          <p:cNvCxnSpPr>
+            <a:cxnSpLocks/>
+          </p:cNvCxnSpPr>
+          <p:nvPr/>
+        </p:nvCxnSpPr>
+        <p:spPr>
+          <a:xfrm flipV="1">
+            <a:off x="5851949" y="2505896"/>
+            <a:ext cx="2117384" cy="11404"/>
+          </a:xfrm>
+          <a:prstGeom prst="straightConnector1">
+            <a:avLst/>
+          </a:prstGeom>
+          <a:ln w="19050">
+            <a:solidFill>
+              <a:srgbClr val="0070C0"/>
+            </a:solidFill>
+            <a:prstDash val="sysDash"/>
+            <a:headEnd type="arrow" w="med" len="med"/>
+            <a:tailEnd type="none" w="med" len="med"/>
+          </a:ln>
+        </p:spPr>
+        <p:style>
+          <a:lnRef idx="1">
+            <a:schemeClr val="accent1"/>
+          </a:lnRef>
+          <a:fillRef idx="0">
+            <a:schemeClr val="accent1"/>
+          </a:fillRef>
+          <a:effectRef idx="0">
+            <a:schemeClr val="accent1"/>
+          </a:effectRef>
+          <a:fontRef idx="minor">
+            <a:schemeClr val="tx1"/>
+          </a:fontRef>
+        </p:style>
+      </p:cxnSp>
+      <p:sp>
+        <p:nvSpPr>
+          <p:cNvPr id="43" name="TextBox 42">
+            <a:extLst>
+              <a:ext uri="{FF2B5EF4-FFF2-40B4-BE49-F238E27FC236}">
+                <a16:creationId xmlns:a16="http://schemas.microsoft.com/office/drawing/2014/main" id="{6419B283-8215-49E8-8D24-70914A9309E2}"/>
+              </a:ext>
+            </a:extLst>
+          </p:cNvPr>
+          <p:cNvSpPr txBox="1"/>
+          <p:nvPr/>
+        </p:nvSpPr>
+        <p:spPr>
+          <a:xfrm>
+            <a:off x="3496869" y="1846462"/>
+            <a:ext cx="2256704" cy="215444"/>
+          </a:xfrm>
+          <a:prstGeom prst="rect">
+            <a:avLst/>
+          </a:prstGeom>
+          <a:noFill/>
+        </p:spPr>
+        <p:txBody>
+          <a:bodyPr wrap="square" lIns="0" tIns="0" rIns="0" bIns="0" rtlCol="0">
+            <a:spAutoFit/>
+          </a:bodyPr>
+          <a:lstStyle>
+            <a:defPPr>
+              <a:defRPr lang="en-US"/>
+            </a:defPPr>
+            <a:lvl1pPr algn="r">
+              <a:defRPr sz="1400">
+                <a:solidFill>
+                  <a:srgbClr val="0070C0"/>
+                </a:solidFill>
+              </a:defRPr>
+            </a:lvl1pPr>
+          </a:lstStyle>
+          <a:p>
+            <a:r>
+              <a:rPr lang="en-US" dirty="0"/>
+              <a:t>parse(arguments)</a:t>
+            </a:r>
+          </a:p>
+        </p:txBody>
+      </p:sp>
     </p:spTree>
     <p:extLst>
       <p:ext uri="{BB962C8B-B14F-4D97-AF65-F5344CB8AC3E}">

</xml_diff>

<commit_message>
Update all Developer Guide images
</commit_message>
<xml_diff>
--- a/docs/diagrams/AddTaskSequenceDiagram.pptx
+++ b/docs/diagrams/AddTaskSequenceDiagram.pptx
@@ -124,6 +124,10 @@
     </p:ext>
   </p:extLst>
 </p:presentation>
+</file>
+
+<file path=ppt/revisionInfo.xml><?xml version="1.0" encoding="utf-8"?>
+<p1510:revInfo xmlns:a="http://schemas.openxmlformats.org/drawingml/2006/main" xmlns:r="http://schemas.openxmlformats.org/officeDocument/2006/relationships" xmlns:p1510="http://schemas.microsoft.com/office/powerpoint/2015/10/main"/>
 </file>
 
 <file path=ppt/notesMasters/notesMaster1.xml><?xml version="1.0" encoding="utf-8"?>
@@ -3450,7 +3454,7 @@
         </p:nvSpPr>
         <p:spPr>
           <a:xfrm>
-            <a:off x="996043" y="926286"/>
+            <a:off x="-305851" y="1977341"/>
             <a:ext cx="8847118" cy="4343400"/>
           </a:xfrm>
           <a:prstGeom prst="roundRect">
@@ -3511,7 +3515,7 @@
         </p:nvSpPr>
         <p:spPr>
           <a:xfrm>
-            <a:off x="1155288" y="1241632"/>
+            <a:off x="-146606" y="2292687"/>
             <a:ext cx="1455629" cy="346760"/>
           </a:xfrm>
           <a:prstGeom prst="rect">
@@ -3580,7 +3584,7 @@
         </p:nvCxnSpPr>
         <p:spPr>
           <a:xfrm>
-            <a:off x="1883102" y="1605303"/>
+            <a:off x="581208" y="2656358"/>
             <a:ext cx="0" cy="3481399"/>
           </a:xfrm>
           <a:prstGeom prst="line">
@@ -3617,7 +3621,7 @@
         </p:nvSpPr>
         <p:spPr>
           <a:xfrm>
-            <a:off x="1811094" y="1955997"/>
+            <a:off x="509200" y="3007052"/>
             <a:ext cx="152400" cy="2932689"/>
           </a:xfrm>
           <a:prstGeom prst="rect">
@@ -3664,7 +3668,7 @@
         </p:nvSpPr>
         <p:spPr>
           <a:xfrm>
-            <a:off x="3709331" y="1120708"/>
+            <a:off x="2407437" y="2171763"/>
             <a:ext cx="1219200" cy="467684"/>
           </a:xfrm>
           <a:prstGeom prst="rect">
@@ -3736,7 +3740,7 @@
         </p:nvCxnSpPr>
         <p:spPr>
           <a:xfrm>
-            <a:off x="4322730" y="1605303"/>
+            <a:off x="3020836" y="2656358"/>
             <a:ext cx="0" cy="1482984"/>
           </a:xfrm>
           <a:prstGeom prst="line">
@@ -3773,7 +3777,7 @@
         </p:nvSpPr>
         <p:spPr>
           <a:xfrm>
-            <a:off x="4250723" y="2063496"/>
+            <a:off x="2948829" y="3114551"/>
             <a:ext cx="154408" cy="767790"/>
           </a:xfrm>
           <a:prstGeom prst="rect">
@@ -3827,7 +3831,7 @@
         </p:nvCxnSpPr>
         <p:spPr>
           <a:xfrm>
-            <a:off x="5874225" y="1796008"/>
+            <a:off x="4572331" y="2847063"/>
             <a:ext cx="16692" cy="3205785"/>
           </a:xfrm>
           <a:prstGeom prst="line">
@@ -3864,7 +3868,7 @@
         </p:nvSpPr>
         <p:spPr>
           <a:xfrm>
-            <a:off x="5795658" y="2092445"/>
+            <a:off x="4493764" y="3143500"/>
             <a:ext cx="154767" cy="494878"/>
           </a:xfrm>
           <a:prstGeom prst="rect">
@@ -3913,7 +3917,7 @@
         </p:nvCxnSpPr>
         <p:spPr>
           <a:xfrm>
-            <a:off x="691243" y="1959685"/>
+            <a:off x="-610651" y="3010740"/>
             <a:ext cx="1119851" cy="0"/>
           </a:xfrm>
           <a:prstGeom prst="straightConnector1">
@@ -3949,7 +3953,7 @@
         </p:nvSpPr>
         <p:spPr>
           <a:xfrm>
-            <a:off x="-32657" y="1688286"/>
+            <a:off x="-1202392" y="2739349"/>
             <a:ext cx="1767746" cy="215444"/>
           </a:xfrm>
           <a:prstGeom prst="rect">
@@ -4001,7 +4005,7 @@
         </p:nvCxnSpPr>
         <p:spPr>
           <a:xfrm>
-            <a:off x="4424388" y="2137253"/>
+            <a:off x="3122494" y="3188308"/>
             <a:ext cx="1364110" cy="0"/>
           </a:xfrm>
           <a:prstGeom prst="straightConnector1">
@@ -4037,7 +4041,7 @@
         </p:nvSpPr>
         <p:spPr>
           <a:xfrm>
-            <a:off x="3515564" y="3181757"/>
+            <a:off x="2213670" y="4232812"/>
             <a:ext cx="855809" cy="215444"/>
           </a:xfrm>
           <a:prstGeom prst="rect">
@@ -4079,7 +4083,7 @@
         </p:nvCxnSpPr>
         <p:spPr>
           <a:xfrm>
-            <a:off x="4381251" y="2575918"/>
+            <a:off x="3079357" y="3626973"/>
             <a:ext cx="1492974" cy="0"/>
           </a:xfrm>
           <a:prstGeom prst="straightConnector1">
@@ -4119,7 +4123,7 @@
         </p:nvCxnSpPr>
         <p:spPr>
           <a:xfrm>
-            <a:off x="1963494" y="2831286"/>
+            <a:off x="661600" y="3882341"/>
             <a:ext cx="2348067" cy="0"/>
           </a:xfrm>
           <a:prstGeom prst="straightConnector1">
@@ -4159,7 +4163,7 @@
         </p:nvCxnSpPr>
         <p:spPr>
           <a:xfrm>
-            <a:off x="653142" y="4888686"/>
+            <a:off x="-648752" y="5939741"/>
             <a:ext cx="1196051" cy="0"/>
           </a:xfrm>
           <a:prstGeom prst="straightConnector1">
@@ -4197,7 +4201,7 @@
         </p:nvSpPr>
         <p:spPr>
           <a:xfrm>
-            <a:off x="8003056" y="3429000"/>
+            <a:off x="6701162" y="4480055"/>
             <a:ext cx="161322" cy="1307285"/>
           </a:xfrm>
           <a:prstGeom prst="rect">
@@ -4244,7 +4248,7 @@
         </p:nvSpPr>
         <p:spPr>
           <a:xfrm>
-            <a:off x="1994017" y="1799727"/>
+            <a:off x="692123" y="2850782"/>
             <a:ext cx="2256704" cy="215444"/>
           </a:xfrm>
           <a:prstGeom prst="rect">
@@ -4296,7 +4300,7 @@
         </p:nvSpPr>
         <p:spPr>
           <a:xfrm>
-            <a:off x="3544898" y="4488762"/>
+            <a:off x="2243004" y="5539817"/>
             <a:ext cx="621216" cy="215444"/>
           </a:xfrm>
           <a:prstGeom prst="rect">
@@ -4336,7 +4340,7 @@
         </p:nvSpPr>
         <p:spPr>
           <a:xfrm>
-            <a:off x="917413" y="4643587"/>
+            <a:off x="-384481" y="5694642"/>
             <a:ext cx="762000" cy="215444"/>
           </a:xfrm>
           <a:prstGeom prst="rect">
@@ -4376,7 +4380,7 @@
         </p:nvSpPr>
         <p:spPr>
           <a:xfrm>
-            <a:off x="2996935" y="2603479"/>
+            <a:off x="1695041" y="3654534"/>
             <a:ext cx="220343" cy="215444"/>
           </a:xfrm>
           <a:prstGeom prst="rect">
@@ -4416,7 +4420,7 @@
         </p:nvSpPr>
         <p:spPr>
           <a:xfrm>
-            <a:off x="7192604" y="1500320"/>
+            <a:off x="5890710" y="2551375"/>
             <a:ext cx="1901758" cy="432035"/>
           </a:xfrm>
           <a:prstGeom prst="rect">
@@ -4492,7 +4496,7 @@
         </p:nvCxnSpPr>
         <p:spPr>
           <a:xfrm>
-            <a:off x="8050424" y="1920783"/>
+            <a:off x="6748530" y="2971838"/>
             <a:ext cx="33293" cy="3296724"/>
           </a:xfrm>
           <a:prstGeom prst="line">
@@ -4529,7 +4533,7 @@
         </p:nvSpPr>
         <p:spPr>
           <a:xfrm>
-            <a:off x="7990427" y="2224444"/>
+            <a:off x="6688533" y="3275499"/>
             <a:ext cx="139932" cy="266380"/>
           </a:xfrm>
           <a:prstGeom prst="rect">
@@ -4578,7 +4582,7 @@
         </p:nvCxnSpPr>
         <p:spPr>
           <a:xfrm flipV="1">
-            <a:off x="5950425" y="2217737"/>
+            <a:off x="4648531" y="3268792"/>
             <a:ext cx="2065628" cy="15567"/>
           </a:xfrm>
           <a:prstGeom prst="straightConnector1">
@@ -4614,7 +4618,7 @@
         </p:nvSpPr>
         <p:spPr>
           <a:xfrm>
-            <a:off x="5745023" y="4955897"/>
+            <a:off x="4443129" y="6006952"/>
             <a:ext cx="258404" cy="261610"/>
           </a:xfrm>
           <a:prstGeom prst="rect">
@@ -4647,7 +4651,7 @@
         </p:nvSpPr>
         <p:spPr>
           <a:xfrm>
-            <a:off x="5264863" y="1354386"/>
+            <a:off x="3962969" y="2405441"/>
             <a:ext cx="1699146" cy="461538"/>
           </a:xfrm>
           <a:prstGeom prst="rect">
@@ -4737,7 +4741,7 @@
         </p:nvCxnSpPr>
         <p:spPr>
           <a:xfrm>
-            <a:off x="1963494" y="3429000"/>
+            <a:off x="661600" y="4480055"/>
             <a:ext cx="6005839" cy="0"/>
           </a:xfrm>
           <a:prstGeom prst="straightConnector1">
@@ -4781,7 +4785,7 @@
         </p:nvCxnSpPr>
         <p:spPr>
           <a:xfrm>
-            <a:off x="1980388" y="2061604"/>
+            <a:off x="678494" y="3112659"/>
             <a:ext cx="2256705" cy="1"/>
           </a:xfrm>
           <a:prstGeom prst="straightConnector1">
@@ -4825,7 +4829,7 @@
         </p:nvCxnSpPr>
         <p:spPr>
           <a:xfrm>
-            <a:off x="1963494" y="4703864"/>
+            <a:off x="661600" y="5754919"/>
             <a:ext cx="6035665" cy="0"/>
           </a:xfrm>
           <a:prstGeom prst="straightConnector1">
@@ -4871,7 +4875,7 @@
         </p:nvCxnSpPr>
         <p:spPr>
           <a:xfrm flipV="1">
-            <a:off x="5851949" y="2505896"/>
+            <a:off x="4550055" y="3556951"/>
             <a:ext cx="2117384" cy="11404"/>
           </a:xfrm>
           <a:prstGeom prst="straightConnector1">
@@ -4915,7 +4919,7 @@
         </p:nvSpPr>
         <p:spPr>
           <a:xfrm>
-            <a:off x="3496869" y="1846462"/>
+            <a:off x="2194975" y="2897517"/>
             <a:ext cx="2256704" cy="215444"/>
           </a:xfrm>
           <a:prstGeom prst="rect">
@@ -4944,6 +4948,536 @@
               <a:rPr lang="en-US" dirty="0"/>
               <a:t>parse(arguments)</a:t>
             </a:r>
+          </a:p>
+        </p:txBody>
+      </p:sp>
+      <p:sp>
+        <p:nvSpPr>
+          <p:cNvPr id="52" name="Rectangle 62">
+            <a:extLst>
+              <a:ext uri="{FF2B5EF4-FFF2-40B4-BE49-F238E27FC236}">
+                <a16:creationId xmlns:a16="http://schemas.microsoft.com/office/drawing/2014/main" id="{073EFBA8-8DD1-4270-A238-B508A73189E6}"/>
+              </a:ext>
+            </a:extLst>
+          </p:cNvPr>
+          <p:cNvSpPr/>
+          <p:nvPr/>
+        </p:nvSpPr>
+        <p:spPr>
+          <a:xfrm>
+            <a:off x="8265896" y="2362200"/>
+            <a:ext cx="1030504" cy="346760"/>
+          </a:xfrm>
+          <a:prstGeom prst="rect">
+            <a:avLst/>
+          </a:prstGeom>
+          <a:solidFill>
+            <a:schemeClr val="accent4">
+              <a:lumMod val="60000"/>
+              <a:lumOff val="40000"/>
+            </a:schemeClr>
+          </a:solidFill>
+          <a:ln w="19050">
+            <a:solidFill>
+              <a:schemeClr val="accent4">
+                <a:lumMod val="60000"/>
+                <a:lumOff val="40000"/>
+              </a:schemeClr>
+            </a:solidFill>
+          </a:ln>
+          <a:effectLst/>
+        </p:spPr>
+        <p:style>
+          <a:lnRef idx="1">
+            <a:schemeClr val="accent2"/>
+          </a:lnRef>
+          <a:fillRef idx="2">
+            <a:schemeClr val="accent2"/>
+          </a:fillRef>
+          <a:effectRef idx="1">
+            <a:schemeClr val="accent2"/>
+          </a:effectRef>
+          <a:fontRef idx="minor">
+            <a:schemeClr val="dk1"/>
+          </a:fontRef>
+        </p:style>
+        <p:txBody>
+          <a:bodyPr rtlCol="0" anchor="ctr"/>
+          <a:lstStyle/>
+          <a:p>
+            <a:pPr algn="ctr"/>
+            <a:r>
+              <a:rPr lang="en-US" sz="1600" dirty="0">
+                <a:solidFill>
+                  <a:schemeClr val="bg1"/>
+                </a:solidFill>
+              </a:rPr>
+              <a:t>:Model</a:t>
+            </a:r>
+            <a:endParaRPr lang="en-SG" sz="1600" dirty="0">
+              <a:solidFill>
+                <a:schemeClr val="bg1"/>
+              </a:solidFill>
+            </a:endParaRPr>
+          </a:p>
+        </p:txBody>
+      </p:sp>
+      <p:cxnSp>
+        <p:nvCxnSpPr>
+          <p:cNvPr id="53" name="Straight Connector 52">
+            <a:extLst>
+              <a:ext uri="{FF2B5EF4-FFF2-40B4-BE49-F238E27FC236}">
+                <a16:creationId xmlns:a16="http://schemas.microsoft.com/office/drawing/2014/main" id="{F5455737-B826-49A8-944F-AAD6B96D2B52}"/>
+              </a:ext>
+            </a:extLst>
+          </p:cNvPr>
+          <p:cNvCxnSpPr/>
+          <p:nvPr/>
+        </p:nvCxnSpPr>
+        <p:spPr>
+          <a:xfrm>
+            <a:off x="8781148" y="2700858"/>
+            <a:ext cx="0" cy="2830598"/>
+          </a:xfrm>
+          <a:prstGeom prst="line">
+            <a:avLst/>
+          </a:prstGeom>
+          <a:ln w="19050">
+            <a:solidFill>
+              <a:schemeClr val="accent4">
+                <a:lumMod val="60000"/>
+                <a:lumOff val="40000"/>
+              </a:schemeClr>
+            </a:solidFill>
+            <a:prstDash val="sysDash"/>
+          </a:ln>
+          <a:effectLst/>
+        </p:spPr>
+        <p:style>
+          <a:lnRef idx="1">
+            <a:schemeClr val="accent1"/>
+          </a:lnRef>
+          <a:fillRef idx="2">
+            <a:schemeClr val="accent1"/>
+          </a:fillRef>
+          <a:effectRef idx="1">
+            <a:schemeClr val="accent1"/>
+          </a:effectRef>
+          <a:fontRef idx="minor">
+            <a:schemeClr val="dk1"/>
+          </a:fontRef>
+        </p:style>
+      </p:cxnSp>
+      <p:sp>
+        <p:nvSpPr>
+          <p:cNvPr id="54" name="Rectangle 53">
+            <a:extLst>
+              <a:ext uri="{FF2B5EF4-FFF2-40B4-BE49-F238E27FC236}">
+                <a16:creationId xmlns:a16="http://schemas.microsoft.com/office/drawing/2014/main" id="{9B6588D9-2D81-4EE0-A023-35AAB7BD0E40}"/>
+              </a:ext>
+            </a:extLst>
+          </p:cNvPr>
+          <p:cNvSpPr/>
+          <p:nvPr/>
+        </p:nvSpPr>
+        <p:spPr>
+          <a:xfrm>
+            <a:off x="7686353" y="5628392"/>
+            <a:ext cx="170880" cy="126528"/>
+          </a:xfrm>
+          <a:prstGeom prst="rect">
+            <a:avLst/>
+          </a:prstGeom>
+          <a:solidFill>
+            <a:srgbClr val="0070C0"/>
+          </a:solidFill>
+          <a:ln>
+            <a:solidFill>
+              <a:srgbClr val="0070C0"/>
+            </a:solidFill>
+          </a:ln>
+          <a:effectLst/>
+        </p:spPr>
+        <p:style>
+          <a:lnRef idx="1">
+            <a:schemeClr val="accent3"/>
+          </a:lnRef>
+          <a:fillRef idx="2">
+            <a:schemeClr val="accent3"/>
+          </a:fillRef>
+          <a:effectRef idx="1">
+            <a:schemeClr val="accent3"/>
+          </a:effectRef>
+          <a:fontRef idx="minor">
+            <a:schemeClr val="dk1"/>
+          </a:fontRef>
+        </p:style>
+        <p:txBody>
+          <a:bodyPr rtlCol="0" anchor="ctr"/>
+          <a:lstStyle/>
+          <a:p>
+            <a:pPr algn="ctr"/>
+            <a:endParaRPr lang="en-SG" sz="1400"/>
+          </a:p>
+        </p:txBody>
+      </p:sp>
+      <p:cxnSp>
+        <p:nvCxnSpPr>
+          <p:cNvPr id="55" name="Straight Arrow Connector 54">
+            <a:extLst>
+              <a:ext uri="{FF2B5EF4-FFF2-40B4-BE49-F238E27FC236}">
+                <a16:creationId xmlns:a16="http://schemas.microsoft.com/office/drawing/2014/main" id="{6950F86A-55BB-488B-856F-6C02029DB854}"/>
+              </a:ext>
+            </a:extLst>
+          </p:cNvPr>
+          <p:cNvCxnSpPr>
+            <a:cxnSpLocks/>
+            <a:endCxn id="54" idx="2"/>
+          </p:cNvCxnSpPr>
+          <p:nvPr/>
+        </p:nvCxnSpPr>
+        <p:spPr>
+          <a:xfrm>
+            <a:off x="6848774" y="5754919"/>
+            <a:ext cx="923019" cy="1"/>
+          </a:xfrm>
+          <a:prstGeom prst="straightConnector1">
+            <a:avLst/>
+          </a:prstGeom>
+          <a:ln w="19050">
+            <a:solidFill>
+              <a:srgbClr val="0070C0"/>
+            </a:solidFill>
+            <a:prstDash val="sysDash"/>
+            <a:headEnd type="arrow" w="med" len="med"/>
+            <a:tailEnd type="none" w="med" len="med"/>
+          </a:ln>
+        </p:spPr>
+        <p:style>
+          <a:lnRef idx="1">
+            <a:schemeClr val="accent1"/>
+          </a:lnRef>
+          <a:fillRef idx="0">
+            <a:schemeClr val="accent1"/>
+          </a:fillRef>
+          <a:effectRef idx="0">
+            <a:schemeClr val="accent1"/>
+          </a:effectRef>
+          <a:fontRef idx="minor">
+            <a:schemeClr val="tx1"/>
+          </a:fontRef>
+        </p:style>
+      </p:cxnSp>
+      <p:sp>
+        <p:nvSpPr>
+          <p:cNvPr id="56" name="Rectangle 55">
+            <a:extLst>
+              <a:ext uri="{FF2B5EF4-FFF2-40B4-BE49-F238E27FC236}">
+                <a16:creationId xmlns:a16="http://schemas.microsoft.com/office/drawing/2014/main" id="{1EAEA64D-A7C5-4BD8-A260-E2DD80FCB94F}"/>
+              </a:ext>
+            </a:extLst>
+          </p:cNvPr>
+          <p:cNvSpPr/>
+          <p:nvPr/>
+        </p:nvSpPr>
+        <p:spPr>
+          <a:xfrm>
+            <a:off x="6794375" y="4703544"/>
+            <a:ext cx="2166258" cy="307777"/>
+          </a:xfrm>
+          <a:prstGeom prst="rect">
+            <a:avLst/>
+          </a:prstGeom>
+        </p:spPr>
+        <p:txBody>
+          <a:bodyPr wrap="square">
+            <a:spAutoFit/>
+          </a:bodyPr>
+          <a:lstStyle/>
+          <a:p>
+            <a:r>
+              <a:rPr lang="en-US" sz="1400">
+                <a:solidFill>
+                  <a:srgbClr val="7030A0"/>
+                </a:solidFill>
+              </a:rPr>
+              <a:t>updateFilteredPersonList</a:t>
+            </a:r>
+            <a:r>
+              <a:rPr lang="en-US" sz="1400" dirty="0">
+                <a:solidFill>
+                  <a:srgbClr val="7030A0"/>
+                </a:solidFill>
+              </a:rPr>
+              <a:t>()</a:t>
+            </a:r>
+          </a:p>
+        </p:txBody>
+      </p:sp>
+      <p:cxnSp>
+        <p:nvCxnSpPr>
+          <p:cNvPr id="57" name="Straight Arrow Connector 56">
+            <a:extLst>
+              <a:ext uri="{FF2B5EF4-FFF2-40B4-BE49-F238E27FC236}">
+                <a16:creationId xmlns:a16="http://schemas.microsoft.com/office/drawing/2014/main" id="{8456E1E4-D7A6-4751-ADD0-2B27B61CCBA9}"/>
+              </a:ext>
+            </a:extLst>
+          </p:cNvPr>
+          <p:cNvCxnSpPr/>
+          <p:nvPr/>
+        </p:nvCxnSpPr>
+        <p:spPr>
+          <a:xfrm>
+            <a:off x="6850663" y="4524597"/>
+            <a:ext cx="1836137" cy="0"/>
+          </a:xfrm>
+          <a:prstGeom prst="straightConnector1">
+            <a:avLst/>
+          </a:prstGeom>
+          <a:ln w="19050">
+            <a:solidFill>
+              <a:srgbClr val="0070C0"/>
+            </a:solidFill>
+            <a:tailEnd type="arrow"/>
+          </a:ln>
+        </p:spPr>
+        <p:style>
+          <a:lnRef idx="1">
+            <a:schemeClr val="accent1"/>
+          </a:lnRef>
+          <a:fillRef idx="0">
+            <a:schemeClr val="accent1"/>
+          </a:fillRef>
+          <a:effectRef idx="0">
+            <a:schemeClr val="accent1"/>
+          </a:effectRef>
+          <a:fontRef idx="minor">
+            <a:schemeClr val="tx1"/>
+          </a:fontRef>
+        </p:style>
+      </p:cxnSp>
+      <p:sp>
+        <p:nvSpPr>
+          <p:cNvPr id="58" name="Rectangle 62">
+            <a:extLst>
+              <a:ext uri="{FF2B5EF4-FFF2-40B4-BE49-F238E27FC236}">
+                <a16:creationId xmlns:a16="http://schemas.microsoft.com/office/drawing/2014/main" id="{821C8FE9-9CFE-48DB-8C48-1DAB782B90F9}"/>
+              </a:ext>
+            </a:extLst>
+          </p:cNvPr>
+          <p:cNvSpPr/>
+          <p:nvPr/>
+        </p:nvSpPr>
+        <p:spPr>
+          <a:xfrm>
+            <a:off x="7020246" y="5166210"/>
+            <a:ext cx="1590354" cy="461538"/>
+          </a:xfrm>
+          <a:prstGeom prst="rect">
+            <a:avLst/>
+          </a:prstGeom>
+          <a:solidFill>
+            <a:srgbClr val="0070C0"/>
+          </a:solidFill>
+          <a:ln w="19050">
+            <a:solidFill>
+              <a:srgbClr val="0070C0"/>
+            </a:solidFill>
+          </a:ln>
+          <a:effectLst/>
+        </p:spPr>
+        <p:style>
+          <a:lnRef idx="1">
+            <a:schemeClr val="accent2"/>
+          </a:lnRef>
+          <a:fillRef idx="2">
+            <a:schemeClr val="accent2"/>
+          </a:fillRef>
+          <a:effectRef idx="1">
+            <a:schemeClr val="accent2"/>
+          </a:effectRef>
+          <a:fontRef idx="minor">
+            <a:schemeClr val="dk1"/>
+          </a:fontRef>
+        </p:style>
+        <p:txBody>
+          <a:bodyPr rtlCol="0" anchor="ctr"/>
+          <a:lstStyle/>
+          <a:p>
+            <a:pPr algn="ctr"/>
+            <a:r>
+              <a:rPr lang="en-US" sz="1600" dirty="0" err="1">
+                <a:solidFill>
+                  <a:schemeClr val="bg1"/>
+                </a:solidFill>
+              </a:rPr>
+              <a:t>result:Command</a:t>
+            </a:r>
+            <a:r>
+              <a:rPr lang="en-US" sz="1600" dirty="0">
+                <a:solidFill>
+                  <a:schemeClr val="bg1"/>
+                </a:solidFill>
+              </a:rPr>
+              <a:t> Result</a:t>
+            </a:r>
+            <a:endParaRPr lang="en-SG" sz="1600" dirty="0">
+              <a:solidFill>
+                <a:schemeClr val="bg1"/>
+              </a:solidFill>
+            </a:endParaRPr>
+          </a:p>
+        </p:txBody>
+      </p:sp>
+      <p:cxnSp>
+        <p:nvCxnSpPr>
+          <p:cNvPr id="59" name="Straight Arrow Connector 58">
+            <a:extLst>
+              <a:ext uri="{FF2B5EF4-FFF2-40B4-BE49-F238E27FC236}">
+                <a16:creationId xmlns:a16="http://schemas.microsoft.com/office/drawing/2014/main" id="{44692139-C29A-44F3-BD26-0E9E5F16D7A2}"/>
+              </a:ext>
+            </a:extLst>
+          </p:cNvPr>
+          <p:cNvCxnSpPr>
+            <a:cxnSpLocks/>
+          </p:cNvCxnSpPr>
+          <p:nvPr/>
+        </p:nvCxnSpPr>
+        <p:spPr>
+          <a:xfrm>
+            <a:off x="8295523" y="5240720"/>
+            <a:ext cx="247672" cy="0"/>
+          </a:xfrm>
+          <a:prstGeom prst="straightConnector1">
+            <a:avLst/>
+          </a:prstGeom>
+          <a:ln w="19050">
+            <a:headEnd type="none" w="med" len="med"/>
+            <a:tailEnd type="arrow" w="med" len="med"/>
+          </a:ln>
+        </p:spPr>
+        <p:style>
+          <a:lnRef idx="1">
+            <a:schemeClr val="accent1"/>
+          </a:lnRef>
+          <a:fillRef idx="0">
+            <a:schemeClr val="accent1"/>
+          </a:fillRef>
+          <a:effectRef idx="0">
+            <a:schemeClr val="accent1"/>
+          </a:effectRef>
+          <a:fontRef idx="minor">
+            <a:schemeClr val="tx1"/>
+          </a:fontRef>
+        </p:style>
+      </p:cxnSp>
+      <p:cxnSp>
+        <p:nvCxnSpPr>
+          <p:cNvPr id="60" name="Straight Arrow Connector 59">
+            <a:extLst>
+              <a:ext uri="{FF2B5EF4-FFF2-40B4-BE49-F238E27FC236}">
+                <a16:creationId xmlns:a16="http://schemas.microsoft.com/office/drawing/2014/main" id="{47B01FBE-BF1E-444F-B58F-CA756438DAF2}"/>
+              </a:ext>
+            </a:extLst>
+          </p:cNvPr>
+          <p:cNvCxnSpPr/>
+          <p:nvPr/>
+        </p:nvCxnSpPr>
+        <p:spPr>
+          <a:xfrm flipV="1">
+            <a:off x="6848774" y="5113303"/>
+            <a:ext cx="1838026" cy="0"/>
+          </a:xfrm>
+          <a:prstGeom prst="straightConnector1">
+            <a:avLst/>
+          </a:prstGeom>
+          <a:ln w="19050">
+            <a:solidFill>
+              <a:schemeClr val="accent4">
+                <a:lumMod val="60000"/>
+                <a:lumOff val="40000"/>
+              </a:schemeClr>
+            </a:solidFill>
+            <a:prstDash val="sysDash"/>
+            <a:headEnd type="arrow" w="med" len="med"/>
+            <a:tailEnd type="none" w="med" len="med"/>
+          </a:ln>
+        </p:spPr>
+        <p:style>
+          <a:lnRef idx="1">
+            <a:schemeClr val="accent1"/>
+          </a:lnRef>
+          <a:fillRef idx="0">
+            <a:schemeClr val="accent1"/>
+          </a:fillRef>
+          <a:effectRef idx="0">
+            <a:schemeClr val="accent1"/>
+          </a:effectRef>
+          <a:fontRef idx="minor">
+            <a:schemeClr val="tx1"/>
+          </a:fontRef>
+        </p:style>
+      </p:cxnSp>
+      <p:sp>
+        <p:nvSpPr>
+          <p:cNvPr id="61" name="Rectangle 60">
+            <a:extLst>
+              <a:ext uri="{FF2B5EF4-FFF2-40B4-BE49-F238E27FC236}">
+                <a16:creationId xmlns:a16="http://schemas.microsoft.com/office/drawing/2014/main" id="{59E1CE7D-67A4-4CC4-B9F4-4FA238A4F383}"/>
+              </a:ext>
+            </a:extLst>
+          </p:cNvPr>
+          <p:cNvSpPr/>
+          <p:nvPr/>
+        </p:nvSpPr>
+        <p:spPr>
+          <a:xfrm>
+            <a:off x="8686800" y="4524597"/>
+            <a:ext cx="161071" cy="641613"/>
+          </a:xfrm>
+          <a:prstGeom prst="rect">
+            <a:avLst/>
+          </a:prstGeom>
+          <a:solidFill>
+            <a:schemeClr val="accent4">
+              <a:lumMod val="60000"/>
+              <a:lumOff val="40000"/>
+            </a:schemeClr>
+          </a:solidFill>
+          <a:ln>
+            <a:solidFill>
+              <a:schemeClr val="accent4">
+                <a:lumMod val="60000"/>
+                <a:lumOff val="40000"/>
+              </a:schemeClr>
+            </a:solidFill>
+          </a:ln>
+          <a:effectLst/>
+        </p:spPr>
+        <p:style>
+          <a:lnRef idx="1">
+            <a:schemeClr val="accent3"/>
+          </a:lnRef>
+          <a:fillRef idx="2">
+            <a:schemeClr val="accent3"/>
+          </a:fillRef>
+          <a:effectRef idx="1">
+            <a:schemeClr val="accent3"/>
+          </a:effectRef>
+          <a:fontRef idx="minor">
+            <a:schemeClr val="dk1"/>
+          </a:fontRef>
+        </p:style>
+        <p:txBody>
+          <a:bodyPr rtlCol="0" anchor="ctr"/>
+          <a:lstStyle/>
+          <a:p>
+            <a:pPr algn="ctr"/>
+            <a:endParaRPr lang="en-SG" sz="1400">
+              <a:solidFill>
+                <a:schemeClr val="dk1"/>
+              </a:solidFill>
+            </a:endParaRPr>
           </a:p>
         </p:txBody>
       </p:sp>

</xml_diff>